<commit_message>
#905 # 프로젝트 계획서_9_pigeon.doc   Class Design_9_pigeon.pptx   UI Design Template_9_pigeon.pptx # 프로젝트 계획서 7p   Class Design 4p   UI Design Template 9,10p # 요구사항 변경 적용
</commit_message>
<xml_diff>
--- a/doc/2_ 프로젝트 계획서/계획서 자료/Gantt Chart, PERT Chart.pptx
+++ b/doc/2_ 프로젝트 계획서/계획서 자료/Gantt Chart, PERT Chart.pptx
@@ -3544,13 +3544,13 @@
           <p:nvPr>
             <p:extLst>
               <p:ext uri="{D42A27DB-BD31-4B8C-83A1-F6EECF244321}">
-                <p14:modId xmlns:p14="http://schemas.microsoft.com/office/powerpoint/2010/main" val="1991994842"/>
+                <p14:modId xmlns:p14="http://schemas.microsoft.com/office/powerpoint/2010/main" val="1042136740"/>
               </p:ext>
             </p:extLst>
           </p:nvPr>
         </p:nvGraphicFramePr>
         <p:xfrm>
-          <a:off x="371475" y="836707"/>
+          <a:off x="542035" y="836707"/>
           <a:ext cx="4966069" cy="5541285"/>
         </p:xfrm>
         <a:graphic>

</xml_diff>